<commit_message>
Updated PPT for Collaboration-architechture.pptx
</commit_message>
<xml_diff>
--- a/docs/misc/Collaboration-architechture.pptx
+++ b/docs/misc/Collaboration-architechture.pptx
@@ -110,7 +110,7 @@
   </p:defaultTextStyle>
   <p:extLst>
     <p:ext uri="{EFAFB233-063F-42B5-8137-9DF3F51BA10A}">
-      <p15:sldGuideLst xmlns:p15="http://schemas.microsoft.com/office/powerpoint/2012/main">
+      <p15:sldGuideLst xmlns="" xmlns:p15="http://schemas.microsoft.com/office/powerpoint/2012/main">
         <p15:guide id="1" orient="horz" pos="2160" userDrawn="1">
           <p15:clr>
             <a:srgbClr val="A4A3A4"/>
@@ -258,7 +258,7 @@
           <a:p>
             <a:fld id="{4D0C8699-CCE2-42E2-A464-D5140727E26D}" type="datetimeFigureOut">
               <a:rPr lang="en-US" smtClean="0"/>
-              <a:t>11/19/2015</a:t>
+              <a:t>12/11/2015</a:t>
             </a:fld>
             <a:endParaRPr lang="en-US"/>
           </a:p>
@@ -428,7 +428,7 @@
           <a:p>
             <a:fld id="{4D0C8699-CCE2-42E2-A464-D5140727E26D}" type="datetimeFigureOut">
               <a:rPr lang="en-US" smtClean="0"/>
-              <a:t>11/19/2015</a:t>
+              <a:t>12/11/2015</a:t>
             </a:fld>
             <a:endParaRPr lang="en-US"/>
           </a:p>
@@ -608,7 +608,7 @@
           <a:p>
             <a:fld id="{4D0C8699-CCE2-42E2-A464-D5140727E26D}" type="datetimeFigureOut">
               <a:rPr lang="en-US" smtClean="0"/>
-              <a:t>11/19/2015</a:t>
+              <a:t>12/11/2015</a:t>
             </a:fld>
             <a:endParaRPr lang="en-US"/>
           </a:p>
@@ -778,7 +778,7 @@
           <a:p>
             <a:fld id="{4D0C8699-CCE2-42E2-A464-D5140727E26D}" type="datetimeFigureOut">
               <a:rPr lang="en-US" smtClean="0"/>
-              <a:t>11/19/2015</a:t>
+              <a:t>12/11/2015</a:t>
             </a:fld>
             <a:endParaRPr lang="en-US"/>
           </a:p>
@@ -1024,7 +1024,7 @@
           <a:p>
             <a:fld id="{4D0C8699-CCE2-42E2-A464-D5140727E26D}" type="datetimeFigureOut">
               <a:rPr lang="en-US" smtClean="0"/>
-              <a:t>11/19/2015</a:t>
+              <a:t>12/11/2015</a:t>
             </a:fld>
             <a:endParaRPr lang="en-US"/>
           </a:p>
@@ -1256,7 +1256,7 @@
           <a:p>
             <a:fld id="{4D0C8699-CCE2-42E2-A464-D5140727E26D}" type="datetimeFigureOut">
               <a:rPr lang="en-US" smtClean="0"/>
-              <a:t>11/19/2015</a:t>
+              <a:t>12/11/2015</a:t>
             </a:fld>
             <a:endParaRPr lang="en-US"/>
           </a:p>
@@ -1623,7 +1623,7 @@
           <a:p>
             <a:fld id="{4D0C8699-CCE2-42E2-A464-D5140727E26D}" type="datetimeFigureOut">
               <a:rPr lang="en-US" smtClean="0"/>
-              <a:t>11/19/2015</a:t>
+              <a:t>12/11/2015</a:t>
             </a:fld>
             <a:endParaRPr lang="en-US"/>
           </a:p>
@@ -1741,7 +1741,7 @@
           <a:p>
             <a:fld id="{4D0C8699-CCE2-42E2-A464-D5140727E26D}" type="datetimeFigureOut">
               <a:rPr lang="en-US" smtClean="0"/>
-              <a:t>11/19/2015</a:t>
+              <a:t>12/11/2015</a:t>
             </a:fld>
             <a:endParaRPr lang="en-US"/>
           </a:p>
@@ -1836,7 +1836,7 @@
           <a:p>
             <a:fld id="{4D0C8699-CCE2-42E2-A464-D5140727E26D}" type="datetimeFigureOut">
               <a:rPr lang="en-US" smtClean="0"/>
-              <a:t>11/19/2015</a:t>
+              <a:t>12/11/2015</a:t>
             </a:fld>
             <a:endParaRPr lang="en-US"/>
           </a:p>
@@ -2113,7 +2113,7 @@
           <a:p>
             <a:fld id="{4D0C8699-CCE2-42E2-A464-D5140727E26D}" type="datetimeFigureOut">
               <a:rPr lang="en-US" smtClean="0"/>
-              <a:t>11/19/2015</a:t>
+              <a:t>12/11/2015</a:t>
             </a:fld>
             <a:endParaRPr lang="en-US"/>
           </a:p>
@@ -2366,7 +2366,7 @@
           <a:p>
             <a:fld id="{4D0C8699-CCE2-42E2-A464-D5140727E26D}" type="datetimeFigureOut">
               <a:rPr lang="en-US" smtClean="0"/>
-              <a:t>11/19/2015</a:t>
+              <a:t>12/11/2015</a:t>
             </a:fld>
             <a:endParaRPr lang="en-US"/>
           </a:p>
@@ -2579,7 +2579,7 @@
           <a:p>
             <a:fld id="{4D0C8699-CCE2-42E2-A464-D5140727E26D}" type="datetimeFigureOut">
               <a:rPr lang="en-US" smtClean="0"/>
-              <a:t>11/19/2015</a:t>
+              <a:t>12/11/2015</a:t>
             </a:fld>
             <a:endParaRPr lang="en-US"/>
           </a:p>
@@ -3000,7 +3000,7 @@
         </p:blipFill>
         <p:spPr>
           <a:xfrm>
-            <a:off x="184597" y="115911"/>
+            <a:off x="184597" y="537404"/>
             <a:ext cx="5782614" cy="2987899"/>
           </a:xfrm>
           <a:prstGeom prst="rect">
@@ -3024,7 +3024,7 @@
         </p:blipFill>
         <p:spPr>
           <a:xfrm>
-            <a:off x="443382" y="3103810"/>
+            <a:off x="443382" y="3466688"/>
             <a:ext cx="5652618" cy="1867436"/>
           </a:xfrm>
           <a:prstGeom prst="rect">
@@ -3048,7 +3048,7 @@
         </p:blipFill>
         <p:spPr>
           <a:xfrm>
-            <a:off x="443383" y="4971246"/>
+            <a:off x="443383" y="5334124"/>
             <a:ext cx="5652618" cy="1582491"/>
           </a:xfrm>
           <a:prstGeom prst="rect">
@@ -3072,7 +3072,7 @@
         </p:blipFill>
         <p:spPr>
           <a:xfrm>
-            <a:off x="6096000" y="0"/>
+            <a:off x="6096000" y="362878"/>
             <a:ext cx="2200275" cy="3940935"/>
           </a:xfrm>
           <a:prstGeom prst="rect">
@@ -3096,7 +3096,7 @@
         </p:blipFill>
         <p:spPr>
           <a:xfrm>
-            <a:off x="9890707" y="244699"/>
+            <a:off x="9890707" y="607577"/>
             <a:ext cx="2095500" cy="5576552"/>
           </a:xfrm>
           <a:prstGeom prst="rect">
@@ -3120,7 +3120,7 @@
         </p:blipFill>
         <p:spPr>
           <a:xfrm>
-            <a:off x="6470225" y="4971246"/>
+            <a:off x="6470225" y="5334124"/>
             <a:ext cx="2699533" cy="1403796"/>
           </a:xfrm>
           <a:prstGeom prst="rect">
@@ -3128,6 +3128,46 @@
           </a:prstGeom>
         </p:spPr>
       </p:pic>
+      <p:sp>
+        <p:nvSpPr>
+          <p:cNvPr id="2" name="Rectangle 1"/>
+          <p:cNvSpPr/>
+          <p:nvPr/>
+        </p:nvSpPr>
+        <p:spPr>
+          <a:xfrm>
+            <a:off x="221691" y="7358"/>
+            <a:ext cx="7234185" cy="369332"/>
+          </a:xfrm>
+          <a:prstGeom prst="rect">
+            <a:avLst/>
+          </a:prstGeom>
+        </p:spPr>
+        <p:txBody>
+          <a:bodyPr wrap="square">
+            <a:spAutoFit/>
+          </a:bodyPr>
+          <a:lstStyle/>
+          <a:p>
+            <a:pPr fontAlgn="b"/>
+            <a:r>
+              <a:rPr lang="en-US" b="1" u="sng" dirty="0">
+                <a:solidFill>
+                  <a:srgbClr val="000000"/>
+                </a:solidFill>
+                <a:hlinkClick r:id="rId8"/>
+              </a:rPr>
+              <a:t>http://www.cisco.com/web/DE/solutions/collaboration/architecture.html</a:t>
+            </a:r>
+            <a:endParaRPr lang="en-US" b="1" u="sng" dirty="0">
+              <a:solidFill>
+                <a:srgbClr val="000000"/>
+              </a:solidFill>
+              <a:latin typeface="Arial"/>
+            </a:endParaRPr>
+          </a:p>
+        </p:txBody>
+      </p:sp>
     </p:spTree>
     <p:extLst>
       <p:ext uri="{BB962C8B-B14F-4D97-AF65-F5344CB8AC3E}">
@@ -3294,8 +3334,8 @@
         </p:blipFill>
         <p:spPr>
           <a:xfrm>
-            <a:off x="218941" y="115909"/>
-            <a:ext cx="5422006" cy="2562897"/>
+            <a:off x="218940" y="514493"/>
+            <a:ext cx="5422006" cy="2275415"/>
           </a:xfrm>
           <a:prstGeom prst="rect">
             <a:avLst/>
@@ -3318,8 +3358,8 @@
         </p:blipFill>
         <p:spPr>
           <a:xfrm>
-            <a:off x="218942" y="2818193"/>
-            <a:ext cx="5422005" cy="1869717"/>
+            <a:off x="218941" y="3216778"/>
+            <a:ext cx="5422005" cy="1659990"/>
           </a:xfrm>
           <a:prstGeom prst="rect">
             <a:avLst/>
@@ -3342,8 +3382,8 @@
         </p:blipFill>
         <p:spPr>
           <a:xfrm>
-            <a:off x="218941" y="4827297"/>
-            <a:ext cx="5525036" cy="1838325"/>
+            <a:off x="218940" y="5225881"/>
+            <a:ext cx="5525036" cy="1632119"/>
           </a:xfrm>
           <a:prstGeom prst="rect">
             <a:avLst/>
@@ -3366,8 +3406,8 @@
         </p:blipFill>
         <p:spPr>
           <a:xfrm>
-            <a:off x="6096000" y="241681"/>
-            <a:ext cx="2314575" cy="4446230"/>
+            <a:off x="6095999" y="640265"/>
+            <a:ext cx="2314575" cy="3947494"/>
           </a:xfrm>
           <a:prstGeom prst="rect">
             <a:avLst/>
@@ -3390,8 +3430,8 @@
         </p:blipFill>
         <p:spPr>
           <a:xfrm>
-            <a:off x="9434646" y="241681"/>
-            <a:ext cx="2028825" cy="5759873"/>
+            <a:off x="9434645" y="640265"/>
+            <a:ext cx="2028825" cy="5113785"/>
           </a:xfrm>
           <a:prstGeom prst="rect">
             <a:avLst/>
@@ -3414,14 +3454,48 @@
         </p:blipFill>
         <p:spPr>
           <a:xfrm>
-            <a:off x="6470225" y="4971246"/>
-            <a:ext cx="2699533" cy="1403796"/>
+            <a:off x="6470224" y="5369830"/>
+            <a:ext cx="2699533" cy="1246331"/>
           </a:xfrm>
           <a:prstGeom prst="rect">
             <a:avLst/>
           </a:prstGeom>
         </p:spPr>
       </p:pic>
+      <p:sp>
+        <p:nvSpPr>
+          <p:cNvPr id="8" name="Rectangle 7"/>
+          <p:cNvSpPr/>
+          <p:nvPr/>
+        </p:nvSpPr>
+        <p:spPr>
+          <a:xfrm>
+            <a:off x="457199" y="34389"/>
+            <a:ext cx="8440616" cy="369332"/>
+          </a:xfrm>
+          <a:prstGeom prst="rect">
+            <a:avLst/>
+          </a:prstGeom>
+        </p:spPr>
+        <p:txBody>
+          <a:bodyPr wrap="square">
+            <a:spAutoFit/>
+          </a:bodyPr>
+          <a:lstStyle/>
+          <a:p>
+            <a:r>
+              <a:rPr lang="en-US" b="1" u="sng" dirty="0">
+                <a:solidFill>
+                  <a:srgbClr val="000000"/>
+                </a:solidFill>
+                <a:hlinkClick r:id="rId8"/>
+              </a:rPr>
+              <a:t>http://www.cisco.com/web/DE/solutions/ datacenter /architecture.html</a:t>
+            </a:r>
+            <a:endParaRPr lang="en-US" b="1" dirty="0"/>
+          </a:p>
+        </p:txBody>
+      </p:sp>
     </p:spTree>
     <p:extLst>
       <p:ext uri="{BB962C8B-B14F-4D97-AF65-F5344CB8AC3E}">
@@ -3468,8 +3542,8 @@
         </p:blipFill>
         <p:spPr>
           <a:xfrm>
-            <a:off x="273676" y="141668"/>
-            <a:ext cx="4993783" cy="3129566"/>
+            <a:off x="273674" y="336476"/>
+            <a:ext cx="4993783" cy="3216744"/>
           </a:xfrm>
           <a:prstGeom prst="rect">
             <a:avLst/>
@@ -3492,8 +3566,8 @@
         </p:blipFill>
         <p:spPr>
           <a:xfrm>
-            <a:off x="273675" y="3271234"/>
-            <a:ext cx="4993783" cy="2047741"/>
+            <a:off x="413866" y="3495804"/>
+            <a:ext cx="4993783" cy="2104784"/>
           </a:xfrm>
           <a:prstGeom prst="rect">
             <a:avLst/>
@@ -3516,8 +3590,8 @@
         </p:blipFill>
         <p:spPr>
           <a:xfrm>
-            <a:off x="273674" y="5318975"/>
-            <a:ext cx="4993784" cy="1552575"/>
+            <a:off x="301038" y="5484914"/>
+            <a:ext cx="4993784" cy="1595824"/>
           </a:xfrm>
           <a:prstGeom prst="rect">
             <a:avLst/>
@@ -3540,8 +3614,8 @@
         </p:blipFill>
         <p:spPr>
           <a:xfrm>
-            <a:off x="5407651" y="141668"/>
-            <a:ext cx="2381250" cy="4649273"/>
+            <a:off x="5595218" y="706130"/>
+            <a:ext cx="2381250" cy="4778784"/>
           </a:xfrm>
           <a:prstGeom prst="rect">
             <a:avLst/>
@@ -3564,14 +3638,57 @@
         </p:blipFill>
         <p:spPr>
           <a:xfrm>
-            <a:off x="9178008" y="321972"/>
-            <a:ext cx="2619375" cy="6722772"/>
+            <a:off x="8533237" y="484147"/>
+            <a:ext cx="2322331" cy="6126425"/>
           </a:xfrm>
           <a:prstGeom prst="rect">
             <a:avLst/>
           </a:prstGeom>
         </p:spPr>
       </p:pic>
+      <p:sp>
+        <p:nvSpPr>
+          <p:cNvPr id="10" name="Rectangle 9"/>
+          <p:cNvSpPr/>
+          <p:nvPr/>
+        </p:nvSpPr>
+        <p:spPr>
+          <a:xfrm>
+            <a:off x="1652954" y="11540"/>
+            <a:ext cx="8510954" cy="369332"/>
+          </a:xfrm>
+          <a:prstGeom prst="rect">
+            <a:avLst/>
+          </a:prstGeom>
+        </p:spPr>
+        <p:txBody>
+          <a:bodyPr wrap="square">
+            <a:spAutoFit/>
+          </a:bodyPr>
+          <a:lstStyle/>
+          <a:p>
+            <a:r>
+              <a:rPr lang="en-US" b="1" u="sng" dirty="0">
+                <a:solidFill>
+                  <a:srgbClr val="000000"/>
+                </a:solidFill>
+                <a:hlinkClick r:id="rId7"/>
+              </a:rPr>
+              <a:t>http://</a:t>
+            </a:r>
+            <a:r>
+              <a:rPr lang="en-US" b="1" u="sng" dirty="0" smtClean="0">
+                <a:solidFill>
+                  <a:srgbClr val="000000"/>
+                </a:solidFill>
+                <a:hlinkClick r:id="rId7"/>
+              </a:rPr>
+              <a:t>www.cisco.com/web/DE/solutions/sp/architecture.html</a:t>
+            </a:r>
+            <a:endParaRPr lang="en-US" dirty="0"/>
+          </a:p>
+        </p:txBody>
+      </p:sp>
     </p:spTree>
     <p:extLst>
       <p:ext uri="{BB962C8B-B14F-4D97-AF65-F5344CB8AC3E}">
@@ -3746,7 +3863,7 @@
     </a:clrScheme>
     <a:fontScheme name="Office">
       <a:majorFont>
-        <a:latin typeface="Calibri Light" panose="020F0302020204030204"/>
+        <a:latin typeface="Calibri Light"/>
         <a:ea typeface=""/>
         <a:cs typeface=""/>
         <a:font script="Jpan" typeface="ＭＳ Ｐゴシック"/>
@@ -3781,7 +3898,7 @@
         <a:font script="Geor" typeface="Sylfaen"/>
       </a:majorFont>
       <a:minorFont>
-        <a:latin typeface="Calibri" panose="020F0502020204030204"/>
+        <a:latin typeface="Calibri"/>
         <a:ea typeface=""/>
         <a:cs typeface=""/>
         <a:font script="Jpan" typeface="ＭＳ Ｐゴシック"/>
@@ -3958,7 +4075,7 @@
   <a:extraClrSchemeLst/>
   <a:extLst>
     <a:ext uri="{05A4C25C-085E-4340-85A3-A5531E510DB2}">
-      <thm15:themeFamily xmlns:thm15="http://schemas.microsoft.com/office/thememl/2012/main" name="Office Theme" id="{62F939B6-93AF-4DB8-9C6B-D6C7DFDC589F}" vid="{4A3C46E8-61CC-4603-A589-7422A47A8E4A}"/>
+      <thm15:themeFamily xmlns="" xmlns:thm15="http://schemas.microsoft.com/office/thememl/2012/main" name="Office Theme" id="{62F939B6-93AF-4DB8-9C6B-D6C7DFDC589F}" vid="{4A3C46E8-61CC-4603-A589-7422A47A8E4A}"/>
     </a:ext>
   </a:extLst>
 </a:theme>

</xml_diff>